<commit_message>
Added notes on encoding fractionation, also copied to GitHub issue
</commit_message>
<xml_diff>
--- a/specification_document/1_1_draft_specs/Version11_design_considerations.pptx
+++ b/specification_document/1_1_draft_specs/Version11_design_considerations.pptx
@@ -16,6 +16,7 @@
     <p:sldId id="263" r:id="rId10"/>
     <p:sldId id="268" r:id="rId11"/>
     <p:sldId id="269" r:id="rId12"/>
+    <p:sldId id="270" r:id="rId13"/>
   </p:sldIdLst>
   <p:sldSz cx="12192000" cy="6858000"/>
   <p:notesSz cx="6858000" cy="9144000"/>
@@ -114,6 +115,11 @@
       </a:defRPr>
     </a:lvl9pPr>
   </p:defaultTextStyle>
+  <p:extLst>
+    <p:ext uri="{EFAFB233-063F-42B5-8137-9DF3F51BA10A}">
+      <p15:sldGuideLst xmlns:p15="http://schemas.microsoft.com/office/powerpoint/2012/main"/>
+    </p:ext>
+  </p:extLst>
 </p:presentation>
 </file>
 
@@ -248,7 +254,7 @@
           <a:p>
             <a:fld id="{A5DF5BBA-53FA-4729-B4F8-B1275A29E656}" type="datetimeFigureOut">
               <a:rPr lang="en-GB" smtClean="0"/>
-              <a:t>07/08/2017</a:t>
+              <a:t>08/08/2017</a:t>
             </a:fld>
             <a:endParaRPr lang="en-GB"/>
           </a:p>
@@ -418,7 +424,7 @@
           <a:p>
             <a:fld id="{A5DF5BBA-53FA-4729-B4F8-B1275A29E656}" type="datetimeFigureOut">
               <a:rPr lang="en-GB" smtClean="0"/>
-              <a:t>07/08/2017</a:t>
+              <a:t>08/08/2017</a:t>
             </a:fld>
             <a:endParaRPr lang="en-GB"/>
           </a:p>
@@ -598,7 +604,7 @@
           <a:p>
             <a:fld id="{A5DF5BBA-53FA-4729-B4F8-B1275A29E656}" type="datetimeFigureOut">
               <a:rPr lang="en-GB" smtClean="0"/>
-              <a:t>07/08/2017</a:t>
+              <a:t>08/08/2017</a:t>
             </a:fld>
             <a:endParaRPr lang="en-GB"/>
           </a:p>
@@ -768,7 +774,7 @@
           <a:p>
             <a:fld id="{A5DF5BBA-53FA-4729-B4F8-B1275A29E656}" type="datetimeFigureOut">
               <a:rPr lang="en-GB" smtClean="0"/>
-              <a:t>07/08/2017</a:t>
+              <a:t>08/08/2017</a:t>
             </a:fld>
             <a:endParaRPr lang="en-GB"/>
           </a:p>
@@ -1014,7 +1020,7 @@
           <a:p>
             <a:fld id="{A5DF5BBA-53FA-4729-B4F8-B1275A29E656}" type="datetimeFigureOut">
               <a:rPr lang="en-GB" smtClean="0"/>
-              <a:t>07/08/2017</a:t>
+              <a:t>08/08/2017</a:t>
             </a:fld>
             <a:endParaRPr lang="en-GB"/>
           </a:p>
@@ -1246,7 +1252,7 @@
           <a:p>
             <a:fld id="{A5DF5BBA-53FA-4729-B4F8-B1275A29E656}" type="datetimeFigureOut">
               <a:rPr lang="en-GB" smtClean="0"/>
-              <a:t>07/08/2017</a:t>
+              <a:t>08/08/2017</a:t>
             </a:fld>
             <a:endParaRPr lang="en-GB"/>
           </a:p>
@@ -1613,7 +1619,7 @@
           <a:p>
             <a:fld id="{A5DF5BBA-53FA-4729-B4F8-B1275A29E656}" type="datetimeFigureOut">
               <a:rPr lang="en-GB" smtClean="0"/>
-              <a:t>07/08/2017</a:t>
+              <a:t>08/08/2017</a:t>
             </a:fld>
             <a:endParaRPr lang="en-GB"/>
           </a:p>
@@ -1731,7 +1737,7 @@
           <a:p>
             <a:fld id="{A5DF5BBA-53FA-4729-B4F8-B1275A29E656}" type="datetimeFigureOut">
               <a:rPr lang="en-GB" smtClean="0"/>
-              <a:t>07/08/2017</a:t>
+              <a:t>08/08/2017</a:t>
             </a:fld>
             <a:endParaRPr lang="en-GB"/>
           </a:p>
@@ -1826,7 +1832,7 @@
           <a:p>
             <a:fld id="{A5DF5BBA-53FA-4729-B4F8-B1275A29E656}" type="datetimeFigureOut">
               <a:rPr lang="en-GB" smtClean="0"/>
-              <a:t>07/08/2017</a:t>
+              <a:t>08/08/2017</a:t>
             </a:fld>
             <a:endParaRPr lang="en-GB"/>
           </a:p>
@@ -2103,7 +2109,7 @@
           <a:p>
             <a:fld id="{A5DF5BBA-53FA-4729-B4F8-B1275A29E656}" type="datetimeFigureOut">
               <a:rPr lang="en-GB" smtClean="0"/>
-              <a:t>07/08/2017</a:t>
+              <a:t>08/08/2017</a:t>
             </a:fld>
             <a:endParaRPr lang="en-GB"/>
           </a:p>
@@ -2356,7 +2362,7 @@
           <a:p>
             <a:fld id="{A5DF5BBA-53FA-4729-B4F8-B1275A29E656}" type="datetimeFigureOut">
               <a:rPr lang="en-GB" smtClean="0"/>
-              <a:t>07/08/2017</a:t>
+              <a:t>08/08/2017</a:t>
             </a:fld>
             <a:endParaRPr lang="en-GB"/>
           </a:p>
@@ -2569,7 +2575,7 @@
           <a:p>
             <a:fld id="{A5DF5BBA-53FA-4729-B4F8-B1275A29E656}" type="datetimeFigureOut">
               <a:rPr lang="en-GB" smtClean="0"/>
-              <a:t>07/08/2017</a:t>
+              <a:t>08/08/2017</a:t>
             </a:fld>
             <a:endParaRPr lang="en-GB"/>
           </a:p>
@@ -4331,6 +4337,625 @@
 </p:sld>
 </file>
 
+<file path=ppt/slides/slide12.xml><?xml version="1.0" encoding="utf-8"?>
+<p:sld xmlns:a="http://schemas.openxmlformats.org/drawingml/2006/main" xmlns:r="http://schemas.openxmlformats.org/officeDocument/2006/relationships" xmlns:p="http://schemas.openxmlformats.org/presentationml/2006/main">
+  <p:cSld>
+    <p:spTree>
+      <p:nvGrpSpPr>
+        <p:cNvPr id="1" name=""/>
+        <p:cNvGrpSpPr/>
+        <p:nvPr/>
+      </p:nvGrpSpPr>
+      <p:grpSpPr>
+        <a:xfrm>
+          <a:off x="0" y="0"/>
+          <a:ext cx="0" cy="0"/>
+          <a:chOff x="0" y="0"/>
+          <a:chExt cx="0" cy="0"/>
+        </a:xfrm>
+      </p:grpSpPr>
+      <p:sp>
+        <p:nvSpPr>
+          <p:cNvPr id="4" name="Rectangle 1"/>
+          <p:cNvSpPr>
+            <a:spLocks noChangeArrowheads="1"/>
+          </p:cNvSpPr>
+          <p:nvPr/>
+        </p:nvSpPr>
+        <p:spPr bwMode="auto">
+          <a:xfrm>
+            <a:off x="626076" y="1724280"/>
+            <a:ext cx="4721164" cy="830997"/>
+          </a:xfrm>
+          <a:prstGeom prst="rect">
+            <a:avLst/>
+          </a:prstGeom>
+          <a:noFill/>
+          <a:ln>
+            <a:noFill/>
+          </a:ln>
+          <a:effectLst/>
+          <a:extLst>
+            <a:ext uri="{909E8E84-426E-40DD-AFC4-6F175D3DCCD1}">
+              <a14:hiddenFill xmlns:a14="http://schemas.microsoft.com/office/drawing/2010/main">
+                <a:solidFill>
+                  <a:schemeClr val="accent1"/>
+                </a:solidFill>
+              </a14:hiddenFill>
+            </a:ext>
+            <a:ext uri="{91240B29-F687-4F45-9708-019B960494DF}">
+              <a14:hiddenLine xmlns:a14="http://schemas.microsoft.com/office/drawing/2010/main" w="9525">
+                <a:solidFill>
+                  <a:schemeClr val="tx1"/>
+                </a:solidFill>
+                <a:miter lim="800000"/>
+                <a:headEnd/>
+                <a:tailEnd/>
+              </a14:hiddenLine>
+            </a:ext>
+            <a:ext uri="{AF507438-7753-43E0-B8FC-AC1667EBCBE1}">
+              <a14:hiddenEffects xmlns:a14="http://schemas.microsoft.com/office/drawing/2010/main">
+                <a:effectLst>
+                  <a:outerShdw dist="35921" dir="2700000" algn="ctr" rotWithShape="0">
+                    <a:schemeClr val="bg2"/>
+                  </a:outerShdw>
+                </a:effectLst>
+              </a14:hiddenEffects>
+            </a:ext>
+          </a:extLst>
+        </p:spPr>
+        <p:txBody>
+          <a:bodyPr vert="horz" wrap="none" lIns="91440" tIns="45720" rIns="91440" bIns="45720" numCol="1" anchor="ctr" anchorCtr="0" compatLnSpc="1">
+            <a:prstTxWarp prst="textNoShape">
+              <a:avLst/>
+            </a:prstTxWarp>
+            <a:spAutoFit/>
+          </a:bodyPr>
+          <a:lstStyle/>
+          <a:p>
+            <a:pPr marL="0" marR="0" lvl="0" indent="0" algn="l" defTabSz="914400" rtl="0" eaLnBrk="0" fontAlgn="base" latinLnBrk="0" hangingPunct="0">
+              <a:lnSpc>
+                <a:spcPct val="100000"/>
+              </a:lnSpc>
+              <a:spcBef>
+                <a:spcPct val="0"/>
+              </a:spcBef>
+              <a:spcAft>
+                <a:spcPct val="0"/>
+              </a:spcAft>
+              <a:buClrTx/>
+              <a:buSzTx/>
+              <a:buFontTx/>
+              <a:buNone/>
+              <a:tabLst/>
+            </a:pPr>
+            <a:r>
+              <a:rPr kumimoji="0" lang="en-US" altLang="en-US" sz="1600" b="0" i="0" u="none" strike="noStrike" cap="none" normalizeH="0" baseline="0" dirty="0" smtClean="0">
+                <a:ln>
+                  <a:noFill/>
+                </a:ln>
+                <a:solidFill>
+                  <a:schemeClr val="tx1"/>
+                </a:solidFill>
+                <a:effectLst/>
+                <a:latin typeface="Arial Unicode MS" panose="020B0604020202020204" pitchFamily="34" charset="-128"/>
+              </a:rPr>
+              <a:t>PEH sequence ...               </a:t>
+            </a:r>
+            <a:r>
+              <a:rPr kumimoji="0" lang="en-US" altLang="en-US" sz="1600" b="0" i="0" u="none" strike="noStrike" cap="none" normalizeH="0" baseline="0" dirty="0" err="1" smtClean="0">
+                <a:ln>
+                  <a:noFill/>
+                </a:ln>
+                <a:solidFill>
+                  <a:schemeClr val="tx1"/>
+                </a:solidFill>
+                <a:effectLst/>
+                <a:latin typeface="Arial Unicode MS" panose="020B0604020202020204" pitchFamily="34" charset="-128"/>
+              </a:rPr>
+              <a:t>cv_opt_global_ms_run</a:t>
+            </a:r>
+            <a:r>
+              <a:rPr kumimoji="0" lang="en-US" altLang="en-US" sz="1600" b="0" i="0" u="none" strike="noStrike" cap="none" normalizeH="0" baseline="0" dirty="0" smtClean="0">
+                <a:ln>
+                  <a:noFill/>
+                </a:ln>
+                <a:solidFill>
+                  <a:schemeClr val="tx1"/>
+                </a:solidFill>
+                <a:effectLst/>
+                <a:latin typeface="Arial Unicode MS" panose="020B0604020202020204" pitchFamily="34" charset="-128"/>
+              </a:rPr>
+              <a:t> </a:t>
+            </a:r>
+          </a:p>
+          <a:p>
+            <a:pPr marL="0" marR="0" lvl="0" indent="0" algn="l" defTabSz="914400" rtl="0" eaLnBrk="0" fontAlgn="base" latinLnBrk="0" hangingPunct="0">
+              <a:lnSpc>
+                <a:spcPct val="100000"/>
+              </a:lnSpc>
+              <a:spcBef>
+                <a:spcPct val="0"/>
+              </a:spcBef>
+              <a:spcAft>
+                <a:spcPct val="0"/>
+              </a:spcAft>
+              <a:buClrTx/>
+              <a:buSzTx/>
+              <a:buFontTx/>
+              <a:buNone/>
+              <a:tabLst/>
+            </a:pPr>
+            <a:r>
+              <a:rPr kumimoji="0" lang="en-US" altLang="en-US" sz="1600" b="0" i="0" u="none" strike="noStrike" cap="none" normalizeH="0" baseline="0" dirty="0" smtClean="0">
+                <a:ln>
+                  <a:noFill/>
+                </a:ln>
+                <a:solidFill>
+                  <a:schemeClr val="tx1"/>
+                </a:solidFill>
+                <a:effectLst/>
+                <a:latin typeface="Arial Unicode MS" panose="020B0604020202020204" pitchFamily="34" charset="-128"/>
+              </a:rPr>
+              <a:t>PEP VLPASLAANIPVK ... 1,8,15,23 </a:t>
+            </a:r>
+          </a:p>
+          <a:p>
+            <a:pPr marL="0" marR="0" lvl="0" indent="0" algn="l" defTabSz="914400" rtl="0" eaLnBrk="0" fontAlgn="base" latinLnBrk="0" hangingPunct="0">
+              <a:lnSpc>
+                <a:spcPct val="100000"/>
+              </a:lnSpc>
+              <a:spcBef>
+                <a:spcPct val="0"/>
+              </a:spcBef>
+              <a:spcAft>
+                <a:spcPct val="0"/>
+              </a:spcAft>
+              <a:buClrTx/>
+              <a:buSzTx/>
+              <a:buFontTx/>
+              <a:buNone/>
+              <a:tabLst/>
+            </a:pPr>
+            <a:r>
+              <a:rPr kumimoji="0" lang="en-US" altLang="en-US" sz="1600" b="0" i="0" u="none" strike="noStrike" cap="none" normalizeH="0" baseline="0" dirty="0" smtClean="0">
+                <a:ln>
+                  <a:noFill/>
+                </a:ln>
+                <a:solidFill>
+                  <a:schemeClr val="tx1"/>
+                </a:solidFill>
+                <a:effectLst/>
+                <a:latin typeface="Arial Unicode MS" panose="020B0604020202020204" pitchFamily="34" charset="-128"/>
+              </a:rPr>
+              <a:t>PEP VLPASLAANIPVK ... 2,9,16,24</a:t>
+            </a:r>
+            <a:r>
+              <a:rPr kumimoji="0" lang="en-US" altLang="en-US" sz="1600" b="0" i="0" u="none" strike="noStrike" cap="none" normalizeH="0" baseline="0" dirty="0" smtClean="0">
+                <a:ln>
+                  <a:noFill/>
+                </a:ln>
+                <a:solidFill>
+                  <a:schemeClr val="tx1"/>
+                </a:solidFill>
+                <a:effectLst/>
+              </a:rPr>
+              <a:t> </a:t>
+            </a:r>
+            <a:endParaRPr kumimoji="0" lang="en-US" altLang="en-US" sz="1600" b="0" i="0" u="none" strike="noStrike" cap="none" normalizeH="0" baseline="0" dirty="0" smtClean="0">
+              <a:ln>
+                <a:noFill/>
+              </a:ln>
+              <a:solidFill>
+                <a:schemeClr val="tx1"/>
+              </a:solidFill>
+              <a:effectLst/>
+              <a:latin typeface="Arial" panose="020B0604020202020204" pitchFamily="34" charset="0"/>
+            </a:endParaRPr>
+          </a:p>
+        </p:txBody>
+      </p:sp>
+      <p:sp>
+        <p:nvSpPr>
+          <p:cNvPr id="5" name="TextBox 4"/>
+          <p:cNvSpPr txBox="1"/>
+          <p:nvPr/>
+        </p:nvSpPr>
+        <p:spPr>
+          <a:xfrm>
+            <a:off x="780176" y="771787"/>
+            <a:ext cx="2945358" cy="369332"/>
+          </a:xfrm>
+          <a:prstGeom prst="rect">
+            <a:avLst/>
+          </a:prstGeom>
+          <a:noFill/>
+        </p:spPr>
+        <p:txBody>
+          <a:bodyPr wrap="none" rtlCol="0">
+            <a:spAutoFit/>
+          </a:bodyPr>
+          <a:lstStyle/>
+          <a:p>
+            <a:r>
+              <a:rPr lang="en-GB" dirty="0" smtClean="0"/>
+              <a:t>Model suggestion from </a:t>
+            </a:r>
+            <a:r>
+              <a:rPr lang="en-GB" dirty="0" err="1" smtClean="0"/>
+              <a:t>Timo</a:t>
+            </a:r>
+            <a:r>
+              <a:rPr lang="en-GB" dirty="0" smtClean="0"/>
+              <a:t>:</a:t>
+            </a:r>
+            <a:endParaRPr lang="en-GB" dirty="0"/>
+          </a:p>
+        </p:txBody>
+      </p:sp>
+      <p:sp>
+        <p:nvSpPr>
+          <p:cNvPr id="6" name="TextBox 5"/>
+          <p:cNvSpPr txBox="1"/>
+          <p:nvPr/>
+        </p:nvSpPr>
+        <p:spPr>
+          <a:xfrm>
+            <a:off x="160412" y="2954495"/>
+            <a:ext cx="11023133" cy="923330"/>
+          </a:xfrm>
+          <a:prstGeom prst="rect">
+            <a:avLst/>
+          </a:prstGeom>
+          <a:noFill/>
+        </p:spPr>
+        <p:txBody>
+          <a:bodyPr wrap="square" rtlCol="0">
+            <a:spAutoFit/>
+          </a:bodyPr>
+          <a:lstStyle/>
+          <a:p>
+            <a:r>
+              <a:rPr lang="en-GB" dirty="0" smtClean="0"/>
+              <a:t>This could be supported via this route as a backwards compatible update as to how to encode fractions in practice without a schema change, perhaps with the following amendment, so that it is easy to locate the mapping between peptides and fractions </a:t>
+            </a:r>
+            <a:endParaRPr lang="en-GB" dirty="0"/>
+          </a:p>
+        </p:txBody>
+      </p:sp>
+      <p:sp>
+        <p:nvSpPr>
+          <p:cNvPr id="7" name="Rectangle 1"/>
+          <p:cNvSpPr>
+            <a:spLocks noChangeArrowheads="1"/>
+          </p:cNvSpPr>
+          <p:nvPr/>
+        </p:nvSpPr>
+        <p:spPr bwMode="auto">
+          <a:xfrm>
+            <a:off x="308691" y="4228321"/>
+            <a:ext cx="11008058" cy="1077218"/>
+          </a:xfrm>
+          <a:prstGeom prst="rect">
+            <a:avLst/>
+          </a:prstGeom>
+          <a:noFill/>
+          <a:ln>
+            <a:noFill/>
+          </a:ln>
+          <a:effectLst/>
+          <a:extLst>
+            <a:ext uri="{909E8E84-426E-40DD-AFC4-6F175D3DCCD1}">
+              <a14:hiddenFill xmlns:a14="http://schemas.microsoft.com/office/drawing/2010/main">
+                <a:solidFill>
+                  <a:schemeClr val="accent1"/>
+                </a:solidFill>
+              </a14:hiddenFill>
+            </a:ext>
+            <a:ext uri="{91240B29-F687-4F45-9708-019B960494DF}">
+              <a14:hiddenLine xmlns:a14="http://schemas.microsoft.com/office/drawing/2010/main" w="9525">
+                <a:solidFill>
+                  <a:schemeClr val="tx1"/>
+                </a:solidFill>
+                <a:miter lim="800000"/>
+                <a:headEnd/>
+                <a:tailEnd/>
+              </a14:hiddenLine>
+            </a:ext>
+            <a:ext uri="{AF507438-7753-43E0-B8FC-AC1667EBCBE1}">
+              <a14:hiddenEffects xmlns:a14="http://schemas.microsoft.com/office/drawing/2010/main">
+                <a:effectLst>
+                  <a:outerShdw dist="35921" dir="2700000" algn="ctr" rotWithShape="0">
+                    <a:schemeClr val="bg2"/>
+                  </a:outerShdw>
+                </a:effectLst>
+              </a14:hiddenEffects>
+            </a:ext>
+          </a:extLst>
+        </p:spPr>
+        <p:txBody>
+          <a:bodyPr vert="horz" wrap="square" lIns="91440" tIns="45720" rIns="91440" bIns="45720" numCol="1" anchor="ctr" anchorCtr="0" compatLnSpc="1">
+            <a:prstTxWarp prst="textNoShape">
+              <a:avLst/>
+            </a:prstTxWarp>
+            <a:spAutoFit/>
+          </a:bodyPr>
+          <a:lstStyle/>
+          <a:p>
+            <a:pPr eaLnBrk="0" fontAlgn="base" hangingPunct="0">
+              <a:spcBef>
+                <a:spcPct val="0"/>
+              </a:spcBef>
+              <a:spcAft>
+                <a:spcPct val="0"/>
+              </a:spcAft>
+            </a:pPr>
+            <a:r>
+              <a:rPr kumimoji="0" lang="en-US" altLang="en-US" sz="1600" b="0" i="0" u="none" strike="noStrike" cap="none" normalizeH="0" baseline="0" dirty="0" smtClean="0">
+                <a:ln>
+                  <a:noFill/>
+                </a:ln>
+                <a:solidFill>
+                  <a:schemeClr val="tx1"/>
+                </a:solidFill>
+                <a:effectLst/>
+              </a:rPr>
+              <a:t>PEH sequence ...             </a:t>
+            </a:r>
+            <a:r>
+              <a:rPr lang="en-US" sz="1600" dirty="0" err="1" smtClean="0"/>
+              <a:t>opt_ms_run</a:t>
+            </a:r>
+            <a:r>
+              <a:rPr lang="en-US" sz="1600" dirty="0" smtClean="0"/>
+              <a:t>[1</a:t>
+            </a:r>
+            <a:r>
+              <a:rPr lang="en-US" sz="1600" dirty="0"/>
+              <a:t>]_</a:t>
+            </a:r>
+            <a:r>
+              <a:rPr lang="en-US" sz="1600" dirty="0" smtClean="0"/>
+              <a:t>cv_MS:100XXXX_fraction_IDs    </a:t>
+            </a:r>
+            <a:r>
+              <a:rPr lang="en-US" sz="1600" dirty="0" err="1" smtClean="0"/>
+              <a:t>opt_ms_run</a:t>
+            </a:r>
+            <a:r>
+              <a:rPr lang="en-US" sz="1600" dirty="0" smtClean="0"/>
+              <a:t>[2]_</a:t>
+            </a:r>
+            <a:r>
+              <a:rPr lang="en-US" sz="1600" dirty="0"/>
+              <a:t>cv_MS:100XXXX_fraction_IDs</a:t>
+            </a:r>
+            <a:endParaRPr lang="en-US" altLang="en-US" sz="1600" dirty="0"/>
+          </a:p>
+          <a:p>
+            <a:pPr lvl="0" eaLnBrk="0" fontAlgn="base" hangingPunct="0">
+              <a:spcBef>
+                <a:spcPct val="0"/>
+              </a:spcBef>
+              <a:spcAft>
+                <a:spcPct val="0"/>
+              </a:spcAft>
+            </a:pPr>
+            <a:endParaRPr kumimoji="0" lang="en-US" altLang="en-US" sz="1600" b="0" i="0" u="none" strike="noStrike" cap="none" normalizeH="0" baseline="0" dirty="0" smtClean="0">
+              <a:ln>
+                <a:noFill/>
+              </a:ln>
+              <a:solidFill>
+                <a:schemeClr val="tx1"/>
+              </a:solidFill>
+              <a:effectLst/>
+            </a:endParaRPr>
+          </a:p>
+          <a:p>
+            <a:pPr marL="0" marR="0" lvl="0" indent="0" algn="l" defTabSz="914400" rtl="0" eaLnBrk="0" fontAlgn="base" latinLnBrk="0" hangingPunct="0">
+              <a:lnSpc>
+                <a:spcPct val="100000"/>
+              </a:lnSpc>
+              <a:spcBef>
+                <a:spcPct val="0"/>
+              </a:spcBef>
+              <a:spcAft>
+                <a:spcPct val="0"/>
+              </a:spcAft>
+              <a:buClrTx/>
+              <a:buSzTx/>
+              <a:buFontTx/>
+              <a:buNone/>
+              <a:tabLst/>
+            </a:pPr>
+            <a:r>
+              <a:rPr kumimoji="0" lang="en-US" altLang="en-US" sz="1600" b="0" i="0" u="none" strike="noStrike" cap="none" normalizeH="0" baseline="0" dirty="0" smtClean="0">
+                <a:ln>
+                  <a:noFill/>
+                </a:ln>
+                <a:solidFill>
+                  <a:schemeClr val="tx1"/>
+                </a:solidFill>
+                <a:effectLst/>
+              </a:rPr>
+              <a:t>PEP VLPASLAANIPVK ...          1,8,15,23               1,7,16,24 </a:t>
+            </a:r>
+          </a:p>
+          <a:p>
+            <a:pPr marL="0" marR="0" lvl="0" indent="0" algn="l" defTabSz="914400" rtl="0" eaLnBrk="0" fontAlgn="base" latinLnBrk="0" hangingPunct="0">
+              <a:lnSpc>
+                <a:spcPct val="100000"/>
+              </a:lnSpc>
+              <a:spcBef>
+                <a:spcPct val="0"/>
+              </a:spcBef>
+              <a:spcAft>
+                <a:spcPct val="0"/>
+              </a:spcAft>
+              <a:buClrTx/>
+              <a:buSzTx/>
+              <a:buFontTx/>
+              <a:buNone/>
+              <a:tabLst/>
+            </a:pPr>
+            <a:r>
+              <a:rPr kumimoji="0" lang="en-US" altLang="en-US" sz="1600" b="0" i="0" u="none" strike="noStrike" cap="none" normalizeH="0" baseline="0" dirty="0" smtClean="0">
+                <a:ln>
+                  <a:noFill/>
+                </a:ln>
+                <a:solidFill>
+                  <a:schemeClr val="tx1"/>
+                </a:solidFill>
+                <a:effectLst/>
+              </a:rPr>
+              <a:t>PEP VLPASLAANIPVK ...          2,9,16,24               2,9,24</a:t>
+            </a:r>
+          </a:p>
+        </p:txBody>
+      </p:sp>
+      <p:sp>
+        <p:nvSpPr>
+          <p:cNvPr id="8" name="Rectangle 7"/>
+          <p:cNvSpPr/>
+          <p:nvPr/>
+        </p:nvSpPr>
+        <p:spPr>
+          <a:xfrm>
+            <a:off x="308691" y="5761032"/>
+            <a:ext cx="7494296" cy="369332"/>
+          </a:xfrm>
+          <a:prstGeom prst="rect">
+            <a:avLst/>
+          </a:prstGeom>
+        </p:spPr>
+        <p:txBody>
+          <a:bodyPr wrap="none">
+            <a:spAutoFit/>
+          </a:bodyPr>
+          <a:lstStyle/>
+          <a:p>
+            <a:r>
+              <a:rPr lang="en-US" dirty="0" smtClean="0">
+                <a:latin typeface="Arial" panose="020B0604020202020204" pitchFamily="34" charset="0"/>
+                <a:ea typeface="Times New Roman" panose="02020603050405020304" pitchFamily="18" charset="0"/>
+                <a:cs typeface="Courier New" panose="02070309020205020404" pitchFamily="49" charset="0"/>
+              </a:rPr>
+              <a:t>MTD  </a:t>
+            </a:r>
+            <a:r>
+              <a:rPr lang="en-US" dirty="0" err="1" smtClean="0">
+                <a:latin typeface="Arial" panose="020B0604020202020204" pitchFamily="34" charset="0"/>
+                <a:ea typeface="Times New Roman" panose="02020603050405020304" pitchFamily="18" charset="0"/>
+                <a:cs typeface="Courier New" panose="02070309020205020404" pitchFamily="49" charset="0"/>
+              </a:rPr>
+              <a:t>ms_run</a:t>
+            </a:r>
+            <a:r>
+              <a:rPr lang="en-US" dirty="0" smtClean="0">
+                <a:latin typeface="Arial" panose="020B0604020202020204" pitchFamily="34" charset="0"/>
+                <a:ea typeface="Times New Roman" panose="02020603050405020304" pitchFamily="18" charset="0"/>
+                <a:cs typeface="Courier New" panose="02070309020205020404" pitchFamily="49" charset="0"/>
+              </a:rPr>
+              <a:t>[1-n]-fraction[1-n]-location    </a:t>
+            </a:r>
+            <a:r>
+              <a:rPr lang="en-US" dirty="0" err="1" smtClean="0">
+                <a:latin typeface="Arial" panose="020B0604020202020204" pitchFamily="34" charset="0"/>
+                <a:ea typeface="Times New Roman" panose="02020603050405020304" pitchFamily="18" charset="0"/>
+                <a:cs typeface="Courier New" panose="02070309020205020404" pitchFamily="49" charset="0"/>
+              </a:rPr>
+              <a:t>LOCATIONOFRAWFILE.raw</a:t>
+            </a:r>
+            <a:r>
+              <a:rPr lang="en-US" dirty="0" smtClean="0">
+                <a:latin typeface="Arial" panose="020B0604020202020204" pitchFamily="34" charset="0"/>
+                <a:ea typeface="Times New Roman" panose="02020603050405020304" pitchFamily="18" charset="0"/>
+                <a:cs typeface="Courier New" panose="02070309020205020404" pitchFamily="49" charset="0"/>
+              </a:rPr>
+              <a:t>  </a:t>
+            </a:r>
+            <a:endParaRPr lang="en-GB" dirty="0"/>
+          </a:p>
+        </p:txBody>
+      </p:sp>
+      <p:sp>
+        <p:nvSpPr>
+          <p:cNvPr id="10" name="TextBox 9"/>
+          <p:cNvSpPr txBox="1"/>
+          <p:nvPr/>
+        </p:nvSpPr>
+        <p:spPr>
+          <a:xfrm>
+            <a:off x="7984219" y="4566875"/>
+            <a:ext cx="4207781" cy="1477328"/>
+          </a:xfrm>
+          <a:prstGeom prst="rect">
+            <a:avLst/>
+          </a:prstGeom>
+          <a:noFill/>
+        </p:spPr>
+        <p:txBody>
+          <a:bodyPr wrap="square" rtlCol="0">
+            <a:spAutoFit/>
+          </a:bodyPr>
+          <a:lstStyle/>
+          <a:p>
+            <a:r>
+              <a:rPr lang="en-GB" i="1" dirty="0" smtClean="0"/>
+              <a:t>This addition is not backwards compatible but extra meta-data can be added without really breaking anything, since no readers or writers can handle fractionated data in mzTab 1.1</a:t>
+            </a:r>
+            <a:endParaRPr lang="en-GB" i="1" dirty="0"/>
+          </a:p>
+        </p:txBody>
+      </p:sp>
+      <p:cxnSp>
+        <p:nvCxnSpPr>
+          <p:cNvPr id="12" name="Straight Arrow Connector 11"/>
+          <p:cNvCxnSpPr>
+            <a:stCxn id="10" idx="1"/>
+          </p:cNvCxnSpPr>
+          <p:nvPr/>
+        </p:nvCxnSpPr>
+        <p:spPr>
+          <a:xfrm flipH="1">
+            <a:off x="6178378" y="5305539"/>
+            <a:ext cx="1805841" cy="455493"/>
+          </a:xfrm>
+          <a:prstGeom prst="straightConnector1">
+            <a:avLst/>
+          </a:prstGeom>
+          <a:ln>
+            <a:tailEnd type="triangle"/>
+          </a:ln>
+        </p:spPr>
+        <p:style>
+          <a:lnRef idx="1">
+            <a:schemeClr val="accent1"/>
+          </a:lnRef>
+          <a:fillRef idx="0">
+            <a:schemeClr val="accent1"/>
+          </a:fillRef>
+          <a:effectRef idx="0">
+            <a:schemeClr val="accent1"/>
+          </a:effectRef>
+          <a:fontRef idx="minor">
+            <a:schemeClr val="tx1"/>
+          </a:fontRef>
+        </p:style>
+      </p:cxnSp>
+    </p:spTree>
+    <p:extLst>
+      <p:ext uri="{BB962C8B-B14F-4D97-AF65-F5344CB8AC3E}">
+        <p14:creationId xmlns:p14="http://schemas.microsoft.com/office/powerpoint/2010/main" val="745987049"/>
+      </p:ext>
+    </p:extLst>
+  </p:cSld>
+  <p:clrMapOvr>
+    <a:masterClrMapping/>
+  </p:clrMapOvr>
+</p:sld>
+</file>
+
 <file path=ppt/slides/slide2.xml><?xml version="1.0" encoding="utf-8"?>
 <p:sld xmlns:a="http://schemas.openxmlformats.org/drawingml/2006/main" xmlns:r="http://schemas.openxmlformats.org/officeDocument/2006/relationships" xmlns:p="http://schemas.openxmlformats.org/presentationml/2006/main">
   <p:cSld>
@@ -5662,17 +6287,12 @@
             </a:r>
             <a:r>
               <a:rPr lang="en-GB" dirty="0" err="1" smtClean="0"/>
-              <a:t>ms_run</a:t>
-            </a:r>
-            <a:r>
-              <a:rPr lang="en-GB" dirty="0" err="1" smtClean="0"/>
-              <a:t>s</a:t>
+              <a:t>ms_runs</a:t>
             </a:r>
             <a:r>
               <a:rPr lang="en-GB" dirty="0" smtClean="0"/>
               <a:t> </a:t>
             </a:r>
-            <a:endParaRPr lang="en-GB" dirty="0" smtClean="0"/>
           </a:p>
           <a:p>
             <a:endParaRPr lang="en-GB" dirty="0"/>

</xml_diff>

<commit_message>
More notes and comments in preparation for Aug 2017 1.1 dev meeting
</commit_message>
<xml_diff>
--- a/specification_document/1_1_draft_specs/Version11_design_considerations.pptx
+++ b/specification_document/1_1_draft_specs/Version11_design_considerations.pptx
@@ -17,6 +17,9 @@
     <p:sldId id="268" r:id="rId11"/>
     <p:sldId id="269" r:id="rId12"/>
     <p:sldId id="270" r:id="rId13"/>
+    <p:sldId id="271" r:id="rId14"/>
+    <p:sldId id="272" r:id="rId15"/>
+    <p:sldId id="273" r:id="rId16"/>
   </p:sldIdLst>
   <p:sldSz cx="12192000" cy="6858000"/>
   <p:notesSz cx="6858000" cy="9144000"/>
@@ -254,7 +257,7 @@
           <a:p>
             <a:fld id="{A5DF5BBA-53FA-4729-B4F8-B1275A29E656}" type="datetimeFigureOut">
               <a:rPr lang="en-GB" smtClean="0"/>
-              <a:t>08/08/2017</a:t>
+              <a:t>20/08/2017</a:t>
             </a:fld>
             <a:endParaRPr lang="en-GB"/>
           </a:p>
@@ -424,7 +427,7 @@
           <a:p>
             <a:fld id="{A5DF5BBA-53FA-4729-B4F8-B1275A29E656}" type="datetimeFigureOut">
               <a:rPr lang="en-GB" smtClean="0"/>
-              <a:t>08/08/2017</a:t>
+              <a:t>20/08/2017</a:t>
             </a:fld>
             <a:endParaRPr lang="en-GB"/>
           </a:p>
@@ -604,7 +607,7 @@
           <a:p>
             <a:fld id="{A5DF5BBA-53FA-4729-B4F8-B1275A29E656}" type="datetimeFigureOut">
               <a:rPr lang="en-GB" smtClean="0"/>
-              <a:t>08/08/2017</a:t>
+              <a:t>20/08/2017</a:t>
             </a:fld>
             <a:endParaRPr lang="en-GB"/>
           </a:p>
@@ -774,7 +777,7 @@
           <a:p>
             <a:fld id="{A5DF5BBA-53FA-4729-B4F8-B1275A29E656}" type="datetimeFigureOut">
               <a:rPr lang="en-GB" smtClean="0"/>
-              <a:t>08/08/2017</a:t>
+              <a:t>20/08/2017</a:t>
             </a:fld>
             <a:endParaRPr lang="en-GB"/>
           </a:p>
@@ -1020,7 +1023,7 @@
           <a:p>
             <a:fld id="{A5DF5BBA-53FA-4729-B4F8-B1275A29E656}" type="datetimeFigureOut">
               <a:rPr lang="en-GB" smtClean="0"/>
-              <a:t>08/08/2017</a:t>
+              <a:t>20/08/2017</a:t>
             </a:fld>
             <a:endParaRPr lang="en-GB"/>
           </a:p>
@@ -1252,7 +1255,7 @@
           <a:p>
             <a:fld id="{A5DF5BBA-53FA-4729-B4F8-B1275A29E656}" type="datetimeFigureOut">
               <a:rPr lang="en-GB" smtClean="0"/>
-              <a:t>08/08/2017</a:t>
+              <a:t>20/08/2017</a:t>
             </a:fld>
             <a:endParaRPr lang="en-GB"/>
           </a:p>
@@ -1619,7 +1622,7 @@
           <a:p>
             <a:fld id="{A5DF5BBA-53FA-4729-B4F8-B1275A29E656}" type="datetimeFigureOut">
               <a:rPr lang="en-GB" smtClean="0"/>
-              <a:t>08/08/2017</a:t>
+              <a:t>20/08/2017</a:t>
             </a:fld>
             <a:endParaRPr lang="en-GB"/>
           </a:p>
@@ -1737,7 +1740,7 @@
           <a:p>
             <a:fld id="{A5DF5BBA-53FA-4729-B4F8-B1275A29E656}" type="datetimeFigureOut">
               <a:rPr lang="en-GB" smtClean="0"/>
-              <a:t>08/08/2017</a:t>
+              <a:t>20/08/2017</a:t>
             </a:fld>
             <a:endParaRPr lang="en-GB"/>
           </a:p>
@@ -1832,7 +1835,7 @@
           <a:p>
             <a:fld id="{A5DF5BBA-53FA-4729-B4F8-B1275A29E656}" type="datetimeFigureOut">
               <a:rPr lang="en-GB" smtClean="0"/>
-              <a:t>08/08/2017</a:t>
+              <a:t>20/08/2017</a:t>
             </a:fld>
             <a:endParaRPr lang="en-GB"/>
           </a:p>
@@ -2109,7 +2112,7 @@
           <a:p>
             <a:fld id="{A5DF5BBA-53FA-4729-B4F8-B1275A29E656}" type="datetimeFigureOut">
               <a:rPr lang="en-GB" smtClean="0"/>
-              <a:t>08/08/2017</a:t>
+              <a:t>20/08/2017</a:t>
             </a:fld>
             <a:endParaRPr lang="en-GB"/>
           </a:p>
@@ -2362,7 +2365,7 @@
           <a:p>
             <a:fld id="{A5DF5BBA-53FA-4729-B4F8-B1275A29E656}" type="datetimeFigureOut">
               <a:rPr lang="en-GB" smtClean="0"/>
-              <a:t>08/08/2017</a:t>
+              <a:t>20/08/2017</a:t>
             </a:fld>
             <a:endParaRPr lang="en-GB"/>
           </a:p>
@@ -2575,7 +2578,7 @@
           <a:p>
             <a:fld id="{A5DF5BBA-53FA-4729-B4F8-B1275A29E656}" type="datetimeFigureOut">
               <a:rPr lang="en-GB" smtClean="0"/>
-              <a:t>08/08/2017</a:t>
+              <a:t>20/08/2017</a:t>
             </a:fld>
             <a:endParaRPr lang="en-GB"/>
           </a:p>
@@ -4139,6 +4142,52 @@
           </a:p>
         </p:txBody>
       </p:sp>
+      <p:sp>
+        <p:nvSpPr>
+          <p:cNvPr id="4" name="TextBox 3"/>
+          <p:cNvSpPr txBox="1"/>
+          <p:nvPr/>
+        </p:nvSpPr>
+        <p:spPr>
+          <a:xfrm>
+            <a:off x="1316736" y="6236208"/>
+            <a:ext cx="6760569" cy="369332"/>
+          </a:xfrm>
+          <a:prstGeom prst="rect">
+            <a:avLst/>
+          </a:prstGeom>
+          <a:noFill/>
+        </p:spPr>
+        <p:txBody>
+          <a:bodyPr wrap="none" rtlCol="0">
+            <a:spAutoFit/>
+          </a:bodyPr>
+          <a:lstStyle/>
+          <a:p>
+            <a:r>
+              <a:rPr lang="en-GB" dirty="0"/>
+              <a:t>More discussion here: </a:t>
+            </a:r>
+            <a:r>
+              <a:rPr lang="en-GB" dirty="0">
+                <a:hlinkClick r:id="rId2"/>
+              </a:rPr>
+              <a:t>https://</a:t>
+            </a:r>
+            <a:r>
+              <a:rPr lang="en-GB" dirty="0" smtClean="0">
+                <a:hlinkClick r:id="rId2"/>
+              </a:rPr>
+              <a:t>github.com/HUPO-PSI/mzTab/issues/26</a:t>
+            </a:r>
+            <a:r>
+              <a:rPr lang="en-GB" dirty="0" smtClean="0"/>
+              <a:t> </a:t>
+            </a:r>
+            <a:endParaRPr lang="en-GB" dirty="0"/>
+          </a:p>
+        </p:txBody>
+      </p:sp>
     </p:spTree>
     <p:extLst>
       <p:ext uri="{BB962C8B-B14F-4D97-AF65-F5344CB8AC3E}">
@@ -4302,8 +4351,8 @@
         </p:nvSpPr>
         <p:spPr>
           <a:xfrm>
-            <a:off x="4038600" y="5992297"/>
-            <a:ext cx="2289794" cy="369332"/>
+            <a:off x="2631942" y="6127234"/>
+            <a:ext cx="6928115" cy="369332"/>
           </a:xfrm>
           <a:prstGeom prst="rect">
             <a:avLst/>
@@ -4318,7 +4367,27 @@
           <a:p>
             <a:r>
               <a:rPr lang="en-GB" b="1" dirty="0" smtClean="0"/>
-              <a:t>MORE WORK NEEDED</a:t>
+              <a:t>MORE WORK </a:t>
+            </a:r>
+            <a:r>
+              <a:rPr lang="en-GB" b="1" dirty="0"/>
+              <a:t>NEEDED </a:t>
+            </a:r>
+            <a:r>
+              <a:rPr lang="en-GB" b="1" dirty="0">
+                <a:hlinkClick r:id="rId2"/>
+              </a:rPr>
+              <a:t>https://</a:t>
+            </a:r>
+            <a:r>
+              <a:rPr lang="en-GB" b="1" dirty="0" smtClean="0">
+                <a:hlinkClick r:id="rId2"/>
+              </a:rPr>
+              <a:t>github.com/HUPO-PSI/mzTab/issues/26</a:t>
+            </a:r>
+            <a:r>
+              <a:rPr lang="en-GB" b="1" dirty="0" smtClean="0"/>
+              <a:t> </a:t>
             </a:r>
             <a:endParaRPr lang="en-GB" b="1" dirty="0"/>
           </a:p>
@@ -4956,6 +5025,451 @@
 </p:sld>
 </file>
 
+<file path=ppt/slides/slide13.xml><?xml version="1.0" encoding="utf-8"?>
+<p:sld xmlns:a="http://schemas.openxmlformats.org/drawingml/2006/main" xmlns:r="http://schemas.openxmlformats.org/officeDocument/2006/relationships" xmlns:p="http://schemas.openxmlformats.org/presentationml/2006/main">
+  <p:cSld>
+    <p:spTree>
+      <p:nvGrpSpPr>
+        <p:cNvPr id="1" name=""/>
+        <p:cNvGrpSpPr/>
+        <p:nvPr/>
+      </p:nvGrpSpPr>
+      <p:grpSpPr>
+        <a:xfrm>
+          <a:off x="0" y="0"/>
+          <a:ext cx="0" cy="0"/>
+          <a:chOff x="0" y="0"/>
+          <a:chExt cx="0" cy="0"/>
+        </a:xfrm>
+      </p:grpSpPr>
+      <p:sp>
+        <p:nvSpPr>
+          <p:cNvPr id="2" name="Title 1"/>
+          <p:cNvSpPr>
+            <a:spLocks noGrp="1"/>
+          </p:cNvSpPr>
+          <p:nvPr>
+            <p:ph type="title"/>
+          </p:nvPr>
+        </p:nvSpPr>
+        <p:spPr/>
+        <p:txBody>
+          <a:bodyPr/>
+          <a:lstStyle/>
+          <a:p>
+            <a:r>
+              <a:rPr lang="en-GB" dirty="0" smtClean="0"/>
+              <a:t>Aug 2017 meeting Main items (core)</a:t>
+            </a:r>
+            <a:endParaRPr lang="en-GB" dirty="0"/>
+          </a:p>
+        </p:txBody>
+      </p:sp>
+      <p:sp>
+        <p:nvSpPr>
+          <p:cNvPr id="3" name="Content Placeholder 2"/>
+          <p:cNvSpPr>
+            <a:spLocks noGrp="1"/>
+          </p:cNvSpPr>
+          <p:nvPr>
+            <p:ph idx="1"/>
+          </p:nvPr>
+        </p:nvSpPr>
+        <p:spPr/>
+        <p:txBody>
+          <a:bodyPr>
+            <a:normAutofit fontScale="85000" lnSpcReduction="20000"/>
+          </a:bodyPr>
+          <a:lstStyle/>
+          <a:p>
+            <a:r>
+              <a:rPr lang="en-GB" dirty="0" smtClean="0"/>
+              <a:t>Agree release plan</a:t>
+            </a:r>
+          </a:p>
+          <a:p>
+            <a:pPr lvl="1"/>
+            <a:r>
+              <a:rPr lang="en-GB" dirty="0" smtClean="0"/>
+              <a:t>Do we want to keep mzTab fully coordinated development between proteomics and metabolomics or split in mzTab-P and mzTab-M</a:t>
+            </a:r>
+          </a:p>
+          <a:p>
+            <a:pPr lvl="1"/>
+            <a:r>
+              <a:rPr lang="en-GB" dirty="0" smtClean="0"/>
+              <a:t>Fully separate formats or a shared core format, with extensions. </a:t>
+            </a:r>
+          </a:p>
+          <a:p>
+            <a:pPr lvl="2"/>
+            <a:r>
+              <a:rPr lang="en-GB" dirty="0" smtClean="0"/>
+              <a:t>The shared core approach would have the benefit of developing something that could be potentially re-used for other communities e.g. </a:t>
+            </a:r>
+            <a:r>
+              <a:rPr lang="en-GB" dirty="0" err="1" smtClean="0"/>
+              <a:t>glycomics</a:t>
+            </a:r>
+            <a:r>
+              <a:rPr lang="en-GB" dirty="0" smtClean="0"/>
+              <a:t>, but again, this is extra work now to split it up</a:t>
+            </a:r>
+          </a:p>
+          <a:p>
+            <a:endParaRPr lang="en-GB" dirty="0"/>
+          </a:p>
+          <a:p>
+            <a:r>
+              <a:rPr lang="en-GB" dirty="0" smtClean="0"/>
+              <a:t>Agree design of Complete versus Summary</a:t>
+            </a:r>
+          </a:p>
+          <a:p>
+            <a:pPr lvl="1"/>
+            <a:r>
+              <a:rPr lang="en-GB" dirty="0" smtClean="0"/>
+              <a:t>Assays and/or SVs mandatory?</a:t>
+            </a:r>
+          </a:p>
+          <a:p>
+            <a:pPr lvl="1"/>
+            <a:r>
+              <a:rPr lang="en-GB" dirty="0" smtClean="0"/>
+              <a:t>What data to report about SVs?</a:t>
+            </a:r>
+          </a:p>
+          <a:p>
+            <a:pPr lvl="1"/>
+            <a:endParaRPr lang="en-GB" dirty="0" smtClean="0"/>
+          </a:p>
+          <a:p>
+            <a:r>
+              <a:rPr lang="en-GB" dirty="0" smtClean="0"/>
+              <a:t>Agree approach for handling pre-fractionation</a:t>
+            </a:r>
+          </a:p>
+          <a:p>
+            <a:endParaRPr lang="en-GB" dirty="0"/>
+          </a:p>
+          <a:p>
+            <a:r>
+              <a:rPr lang="en-GB" dirty="0" smtClean="0"/>
+              <a:t>Agree method to report bio versus tech replicates</a:t>
+            </a:r>
+            <a:endParaRPr lang="en-GB" dirty="0"/>
+          </a:p>
+        </p:txBody>
+      </p:sp>
+    </p:spTree>
+    <p:extLst>
+      <p:ext uri="{BB962C8B-B14F-4D97-AF65-F5344CB8AC3E}">
+        <p14:creationId xmlns:p14="http://schemas.microsoft.com/office/powerpoint/2010/main" val="2024507835"/>
+      </p:ext>
+    </p:extLst>
+  </p:cSld>
+  <p:clrMapOvr>
+    <a:masterClrMapping/>
+  </p:clrMapOvr>
+</p:sld>
+</file>
+
+<file path=ppt/slides/slide14.xml><?xml version="1.0" encoding="utf-8"?>
+<p:sld xmlns:a="http://schemas.openxmlformats.org/drawingml/2006/main" xmlns:r="http://schemas.openxmlformats.org/officeDocument/2006/relationships" xmlns:p="http://schemas.openxmlformats.org/presentationml/2006/main">
+  <p:cSld>
+    <p:spTree>
+      <p:nvGrpSpPr>
+        <p:cNvPr id="1" name=""/>
+        <p:cNvGrpSpPr/>
+        <p:nvPr/>
+      </p:nvGrpSpPr>
+      <p:grpSpPr>
+        <a:xfrm>
+          <a:off x="0" y="0"/>
+          <a:ext cx="0" cy="0"/>
+          <a:chOff x="0" y="0"/>
+          <a:chExt cx="0" cy="0"/>
+        </a:xfrm>
+      </p:grpSpPr>
+      <p:sp>
+        <p:nvSpPr>
+          <p:cNvPr id="2" name="Title 1"/>
+          <p:cNvSpPr>
+            <a:spLocks noGrp="1"/>
+          </p:cNvSpPr>
+          <p:nvPr>
+            <p:ph type="title"/>
+          </p:nvPr>
+        </p:nvSpPr>
+        <p:spPr/>
+        <p:txBody>
+          <a:bodyPr/>
+          <a:lstStyle/>
+          <a:p>
+            <a:r>
+              <a:rPr lang="en-GB" dirty="0"/>
+              <a:t>Aug 2017 meeting Main items </a:t>
+            </a:r>
+            <a:r>
+              <a:rPr lang="en-GB" dirty="0" smtClean="0"/>
+              <a:t>(proteomics)</a:t>
+            </a:r>
+            <a:endParaRPr lang="en-GB" dirty="0"/>
+          </a:p>
+        </p:txBody>
+      </p:sp>
+      <p:sp>
+        <p:nvSpPr>
+          <p:cNvPr id="3" name="Content Placeholder 2"/>
+          <p:cNvSpPr>
+            <a:spLocks noGrp="1"/>
+          </p:cNvSpPr>
+          <p:nvPr>
+            <p:ph idx="1"/>
+          </p:nvPr>
+        </p:nvSpPr>
+        <p:spPr/>
+        <p:txBody>
+          <a:bodyPr>
+            <a:normAutofit fontScale="77500" lnSpcReduction="20000"/>
+          </a:bodyPr>
+          <a:lstStyle/>
+          <a:p>
+            <a:r>
+              <a:rPr lang="en-GB" dirty="0" smtClean="0"/>
+              <a:t>Major decision on whether to keep the distinction between Id versus Quant</a:t>
+            </a:r>
+          </a:p>
+          <a:p>
+            <a:r>
+              <a:rPr lang="en-GB" dirty="0" smtClean="0"/>
+              <a:t>If decided to remove the distinction, then:</a:t>
+            </a:r>
+          </a:p>
+          <a:p>
+            <a:pPr lvl="1"/>
+            <a:r>
+              <a:rPr lang="en-GB" dirty="0" smtClean="0"/>
+              <a:t>Proposal to have Summary be Protein table only; Complete be all three tables</a:t>
+            </a:r>
+          </a:p>
+          <a:p>
+            <a:pPr lvl="1"/>
+            <a:r>
+              <a:rPr lang="en-GB" dirty="0" smtClean="0"/>
+              <a:t>Proposal to add explicit links from Protein to peptide (</a:t>
+            </a:r>
+            <a:r>
+              <a:rPr lang="en-GB" dirty="0" err="1" smtClean="0"/>
+              <a:t>peptide_id</a:t>
+            </a:r>
+            <a:r>
+              <a:rPr lang="en-GB" dirty="0" smtClean="0"/>
+              <a:t>) and from peptide to </a:t>
+            </a:r>
+            <a:r>
+              <a:rPr lang="en-GB" dirty="0" err="1" smtClean="0"/>
+              <a:t>psm</a:t>
+            </a:r>
+            <a:r>
+              <a:rPr lang="en-GB" dirty="0" smtClean="0"/>
+              <a:t> (</a:t>
+            </a:r>
+            <a:r>
+              <a:rPr lang="en-GB" dirty="0" err="1" smtClean="0"/>
+              <a:t>psm_id</a:t>
+            </a:r>
+            <a:r>
+              <a:rPr lang="en-GB" dirty="0" smtClean="0"/>
+              <a:t>)</a:t>
+            </a:r>
+          </a:p>
+          <a:p>
+            <a:pPr lvl="1"/>
+            <a:r>
+              <a:rPr lang="en-GB" dirty="0" smtClean="0"/>
+              <a:t>Decide what to do about </a:t>
+            </a:r>
+            <a:r>
+              <a:rPr lang="en-GB" dirty="0" err="1" smtClean="0"/>
+              <a:t>num_psms_ms_run</a:t>
+            </a:r>
+            <a:r>
+              <a:rPr lang="en-GB" dirty="0" smtClean="0"/>
+              <a:t>[1-n] columns</a:t>
+            </a:r>
+          </a:p>
+          <a:p>
+            <a:r>
+              <a:rPr lang="en-GB" dirty="0" smtClean="0"/>
+              <a:t>Decision on how to report protein grouping info; and peptide mapping to multiple proteins</a:t>
+            </a:r>
+          </a:p>
+          <a:p>
+            <a:r>
+              <a:rPr lang="en-GB" dirty="0" smtClean="0"/>
+              <a:t>Various minor(</a:t>
+            </a:r>
+            <a:r>
+              <a:rPr lang="en-GB" dirty="0" err="1" smtClean="0"/>
+              <a:t>ish</a:t>
+            </a:r>
+            <a:r>
+              <a:rPr lang="en-GB" dirty="0" smtClean="0"/>
+              <a:t>) items about how to report databases, search engines </a:t>
+            </a:r>
+            <a:r>
+              <a:rPr lang="en-GB" dirty="0" err="1" smtClean="0"/>
+              <a:t>etc</a:t>
+            </a:r>
+            <a:r>
+              <a:rPr lang="en-GB" dirty="0" smtClean="0"/>
+              <a:t> flagged as comments on the spec doc</a:t>
+            </a:r>
+          </a:p>
+          <a:p>
+            <a:endParaRPr lang="en-GB" dirty="0"/>
+          </a:p>
+          <a:p>
+            <a:r>
+              <a:rPr lang="en-GB" dirty="0" smtClean="0"/>
+              <a:t>Note – most participants are metabolomics focussed, so at worst some of this work could be deferred if necessary. This will delay a coordinated release of mzTab 1.1 though</a:t>
+            </a:r>
+          </a:p>
+          <a:p>
+            <a:pPr lvl="1"/>
+            <a:r>
+              <a:rPr lang="en-GB" b="1" i="1" dirty="0" smtClean="0"/>
+              <a:t>We could do a mzTab-M 1.1 release, stripped of proteomics details altogether?</a:t>
+            </a:r>
+          </a:p>
+          <a:p>
+            <a:pPr marL="457200" lvl="1" indent="0">
+              <a:buNone/>
+            </a:pPr>
+            <a:endParaRPr lang="en-GB" dirty="0"/>
+          </a:p>
+        </p:txBody>
+      </p:sp>
+    </p:spTree>
+    <p:extLst>
+      <p:ext uri="{BB962C8B-B14F-4D97-AF65-F5344CB8AC3E}">
+        <p14:creationId xmlns:p14="http://schemas.microsoft.com/office/powerpoint/2010/main" val="2266014470"/>
+      </p:ext>
+    </p:extLst>
+  </p:cSld>
+  <p:clrMapOvr>
+    <a:masterClrMapping/>
+  </p:clrMapOvr>
+</p:sld>
+</file>
+
+<file path=ppt/slides/slide15.xml><?xml version="1.0" encoding="utf-8"?>
+<p:sld xmlns:a="http://schemas.openxmlformats.org/drawingml/2006/main" xmlns:r="http://schemas.openxmlformats.org/officeDocument/2006/relationships" xmlns:p="http://schemas.openxmlformats.org/presentationml/2006/main">
+  <p:cSld>
+    <p:spTree>
+      <p:nvGrpSpPr>
+        <p:cNvPr id="1" name=""/>
+        <p:cNvGrpSpPr/>
+        <p:nvPr/>
+      </p:nvGrpSpPr>
+      <p:grpSpPr>
+        <a:xfrm>
+          <a:off x="0" y="0"/>
+          <a:ext cx="0" cy="0"/>
+          <a:chOff x="0" y="0"/>
+          <a:chExt cx="0" cy="0"/>
+        </a:xfrm>
+      </p:grpSpPr>
+      <p:sp>
+        <p:nvSpPr>
+          <p:cNvPr id="2" name="Title 1"/>
+          <p:cNvSpPr>
+            <a:spLocks noGrp="1"/>
+          </p:cNvSpPr>
+          <p:nvPr>
+            <p:ph type="title"/>
+          </p:nvPr>
+        </p:nvSpPr>
+        <p:spPr/>
+        <p:txBody>
+          <a:bodyPr/>
+          <a:lstStyle/>
+          <a:p>
+            <a:r>
+              <a:rPr lang="en-GB" dirty="0"/>
+              <a:t>Aug 2017 meeting Main items </a:t>
+            </a:r>
+            <a:r>
+              <a:rPr lang="en-GB" dirty="0" smtClean="0"/>
+              <a:t>(metabolomics)</a:t>
+            </a:r>
+            <a:endParaRPr lang="en-GB" dirty="0"/>
+          </a:p>
+        </p:txBody>
+      </p:sp>
+      <p:sp>
+        <p:nvSpPr>
+          <p:cNvPr id="3" name="Content Placeholder 2"/>
+          <p:cNvSpPr>
+            <a:spLocks noGrp="1"/>
+          </p:cNvSpPr>
+          <p:nvPr>
+            <p:ph idx="1"/>
+          </p:nvPr>
+        </p:nvSpPr>
+        <p:spPr/>
+        <p:txBody>
+          <a:bodyPr/>
+          <a:lstStyle/>
+          <a:p>
+            <a:r>
+              <a:rPr lang="en-GB" dirty="0" smtClean="0"/>
+              <a:t>Review specification document – various minor-</a:t>
+            </a:r>
+            <a:r>
+              <a:rPr lang="en-GB" dirty="0" err="1" smtClean="0"/>
+              <a:t>ish</a:t>
+            </a:r>
+            <a:r>
+              <a:rPr lang="en-GB" dirty="0" smtClean="0"/>
+              <a:t> items to resolve</a:t>
+            </a:r>
+          </a:p>
+          <a:p>
+            <a:r>
+              <a:rPr lang="en-GB" dirty="0" smtClean="0"/>
+              <a:t>Need a working validator</a:t>
+            </a:r>
+          </a:p>
+          <a:p>
+            <a:r>
+              <a:rPr lang="en-GB" dirty="0" smtClean="0"/>
+              <a:t>Need implementations</a:t>
+            </a:r>
+          </a:p>
+          <a:p>
+            <a:r>
+              <a:rPr lang="en-GB" dirty="0" smtClean="0"/>
+              <a:t>Do we have all controlled vocabularies we need?</a:t>
+            </a:r>
+            <a:endParaRPr lang="en-GB" dirty="0"/>
+          </a:p>
+        </p:txBody>
+      </p:sp>
+    </p:spTree>
+    <p:extLst>
+      <p:ext uri="{BB962C8B-B14F-4D97-AF65-F5344CB8AC3E}">
+        <p14:creationId xmlns:p14="http://schemas.microsoft.com/office/powerpoint/2010/main" val="1521463024"/>
+      </p:ext>
+    </p:extLst>
+  </p:cSld>
+  <p:clrMapOvr>
+    <a:masterClrMapping/>
+  </p:clrMapOvr>
+</p:sld>
+</file>
+
 <file path=ppt/slides/slide2.xml><?xml version="1.0" encoding="utf-8"?>
 <p:sld xmlns:a="http://schemas.openxmlformats.org/drawingml/2006/main" xmlns:r="http://schemas.openxmlformats.org/officeDocument/2006/relationships" xmlns:p="http://schemas.openxmlformats.org/presentationml/2006/main">
   <p:cSld>
@@ -5916,7 +6430,7 @@
         <p:spPr>
           <a:xfrm>
             <a:off x="2604937" y="3377449"/>
-            <a:ext cx="4432300" cy="738664"/>
+            <a:ext cx="4432300" cy="461665"/>
           </a:xfrm>
           <a:prstGeom prst="rect">
             <a:avLst/>
@@ -5930,14 +6444,14 @@
           <a:lstStyle/>
           <a:p>
             <a:r>
-              <a:rPr lang="en-GB" sz="1400" dirty="0" smtClean="0"/>
+              <a:rPr lang="en-GB" sz="1200" dirty="0" smtClean="0"/>
               <a:t>“Final” quantified small molecules of interest e.g. including aggregation across adduct forms or different charge states </a:t>
             </a:r>
             <a:r>
-              <a:rPr lang="en-GB" sz="1400" dirty="0" err="1" smtClean="0"/>
+              <a:rPr lang="en-GB" sz="1200" dirty="0" err="1" smtClean="0"/>
               <a:t>etc</a:t>
             </a:r>
-            <a:endParaRPr lang="en-GB" sz="1400" dirty="0"/>
+            <a:endParaRPr lang="en-GB" sz="1200" dirty="0"/>
           </a:p>
         </p:txBody>
       </p:sp>
@@ -5949,8 +6463,8 @@
         </p:nvSpPr>
         <p:spPr>
           <a:xfrm>
-            <a:off x="2604937" y="4520606"/>
-            <a:ext cx="4126063" cy="954107"/>
+            <a:off x="2604936" y="4232570"/>
+            <a:ext cx="4126063" cy="830997"/>
           </a:xfrm>
           <a:prstGeom prst="rect">
             <a:avLst/>
@@ -5964,18 +6478,14 @@
           <a:lstStyle/>
           <a:p>
             <a:r>
-              <a:rPr lang="en-GB" sz="1400" dirty="0" smtClean="0"/>
-              <a:t>In case of ID only files, abundance columns are nulled; force exporters to add layer aggregating PSMs into peptides (e.g. </a:t>
-            </a:r>
-            <a:r>
-              <a:rPr lang="en-GB" sz="1400" dirty="0" err="1" smtClean="0"/>
-              <a:t>mzIdentML</a:t>
-            </a:r>
-            <a:r>
-              <a:rPr lang="en-GB" sz="1400" dirty="0" smtClean="0"/>
-              <a:t> already has a peptide section anyway, so this is really the same work)</a:t>
-            </a:r>
-            <a:endParaRPr lang="en-GB" sz="1400" dirty="0"/>
+              <a:rPr lang="en-GB" sz="1200" dirty="0" smtClean="0"/>
+              <a:t>In case of ID only files, abundance columns are nulled; force exporters to add layer aggregating PSMs into peptides (e.g. mzIdentML already has a peptide section anyway, so this is really the same work</a:t>
+            </a:r>
+            <a:r>
+              <a:rPr lang="en-GB" sz="1200" dirty="0" smtClean="0"/>
+              <a:t>). </a:t>
+            </a:r>
+            <a:endParaRPr lang="en-GB" sz="1200" dirty="0"/>
           </a:p>
         </p:txBody>
       </p:sp>
@@ -5988,7 +6498,7 @@
         <p:spPr>
           <a:xfrm>
             <a:off x="2604936" y="5495097"/>
-            <a:ext cx="3948264" cy="1169551"/>
+            <a:ext cx="3948264" cy="1015663"/>
           </a:xfrm>
           <a:prstGeom prst="rect">
             <a:avLst/>
@@ -6002,30 +6512,34 @@
           <a:lstStyle/>
           <a:p>
             <a:r>
-              <a:rPr lang="en-GB" sz="1400" dirty="0" smtClean="0"/>
+              <a:rPr lang="en-GB" sz="1200" dirty="0" smtClean="0"/>
               <a:t>1.0 specs imply that PSMs are mandatory for quant, which will be a big pain for some quant software;</a:t>
             </a:r>
             <a:r>
-              <a:rPr lang="en-GB" sz="1400" b="1" dirty="0" smtClean="0"/>
+              <a:rPr lang="en-GB" sz="1200" b="1" dirty="0" smtClean="0"/>
               <a:t> I would vote to make PSM table optional, say with a Boolean flag in the metadata for </a:t>
             </a:r>
             <a:r>
-              <a:rPr lang="en-GB" sz="1400" b="1" dirty="0" err="1" smtClean="0"/>
+              <a:rPr lang="en-GB" sz="1200" b="1" dirty="0" err="1" smtClean="0"/>
               <a:t>PSM_reported</a:t>
             </a:r>
             <a:r>
-              <a:rPr lang="en-GB" sz="1400" b="1" dirty="0" smtClean="0"/>
+              <a:rPr lang="en-GB" sz="1200" b="1" dirty="0" smtClean="0"/>
               <a:t> = “</a:t>
             </a:r>
             <a:r>
-              <a:rPr lang="en-GB" sz="1400" b="1" dirty="0" err="1" smtClean="0"/>
+              <a:rPr lang="en-GB" sz="1200" b="1" dirty="0" err="1" smtClean="0"/>
               <a:t>true|false</a:t>
             </a:r>
             <a:r>
-              <a:rPr lang="en-GB" sz="1400" b="1" dirty="0" smtClean="0"/>
-              <a:t>” (MORE DISCUSSION NEEDED)</a:t>
-            </a:r>
-            <a:endParaRPr lang="en-GB" sz="1400" b="1" dirty="0"/>
+              <a:rPr lang="en-GB" sz="1200" b="1" dirty="0" smtClean="0"/>
+              <a:t>” (MORE DISCUSSION </a:t>
+            </a:r>
+            <a:r>
+              <a:rPr lang="en-GB" sz="1200" b="1" dirty="0" smtClean="0"/>
+              <a:t>NEEDED*)</a:t>
+            </a:r>
+            <a:endParaRPr lang="en-GB" sz="1200" b="1" dirty="0"/>
           </a:p>
         </p:txBody>
       </p:sp>
@@ -6179,6 +6693,44 @@
             <a:r>
               <a:rPr lang="en-GB" dirty="0" smtClean="0"/>
               <a:t>Proteomics Summary</a:t>
+            </a:r>
+            <a:endParaRPr lang="en-GB" dirty="0"/>
+          </a:p>
+        </p:txBody>
+      </p:sp>
+      <p:sp>
+        <p:nvSpPr>
+          <p:cNvPr id="3" name="TextBox 2"/>
+          <p:cNvSpPr txBox="1"/>
+          <p:nvPr/>
+        </p:nvSpPr>
+        <p:spPr>
+          <a:xfrm>
+            <a:off x="7104593" y="4465316"/>
+            <a:ext cx="4599432" cy="2492990"/>
+          </a:xfrm>
+          <a:prstGeom prst="rect">
+            <a:avLst/>
+          </a:prstGeom>
+          <a:noFill/>
+        </p:spPr>
+        <p:txBody>
+          <a:bodyPr wrap="square" rtlCol="0">
+            <a:spAutoFit/>
+          </a:bodyPr>
+          <a:lstStyle/>
+          <a:p>
+            <a:r>
+              <a:rPr lang="en-GB" sz="1200" dirty="0" smtClean="0"/>
+              <a:t>*Additional notes: In an ideal world, we would have data at all three levels in a complete file. The linkage between layers in 1.0 is not explicitly specified.  It is implied that PSMs reporting a given sequence and protein accession have been used to identify the given peptide or protein. This is okay, so long as the exporting tool doesn’t report PSMs not passing the threshold. In general, this could be an issue with mzTab files, since there is no concept of </a:t>
+            </a:r>
+            <a:r>
+              <a:rPr lang="en-GB" sz="1200" dirty="0" err="1" smtClean="0"/>
+              <a:t>pass_threshold</a:t>
+            </a:r>
+            <a:r>
+              <a:rPr lang="en-GB" sz="1200" dirty="0" smtClean="0"/>
+              <a:t> = true. If in mzTab 1.1, explicit links are added between layers then a peptide section could have zero references to the PSM section. This would pass validation (presumably?), but would it cause other problems downstream? This is no better in mzTab 1.0 anyway, since export software could still choose not to report PSMs or report PSMs inconsistent with peptide or protein list.</a:t>
             </a:r>
             <a:endParaRPr lang="en-GB" dirty="0"/>
           </a:p>

</xml_diff>

<commit_message>
More updates to 1.1 specs and powerpoint in preparation for August meeting
</commit_message>
<xml_diff>
--- a/specification_document/1_1_draft_specs/Version11_design_considerations.pptx
+++ b/specification_document/1_1_draft_specs/Version11_design_considerations.pptx
@@ -20,6 +20,7 @@
     <p:sldId id="271" r:id="rId14"/>
     <p:sldId id="272" r:id="rId15"/>
     <p:sldId id="273" r:id="rId16"/>
+    <p:sldId id="274" r:id="rId17"/>
   </p:sldIdLst>
   <p:sldSz cx="12192000" cy="6858000"/>
   <p:notesSz cx="6858000" cy="9144000"/>
@@ -5470,6 +5471,117 @@
 </p:sld>
 </file>
 
+<file path=ppt/slides/slide16.xml><?xml version="1.0" encoding="utf-8"?>
+<p:sld xmlns:a="http://schemas.openxmlformats.org/drawingml/2006/main" xmlns:r="http://schemas.openxmlformats.org/officeDocument/2006/relationships" xmlns:p="http://schemas.openxmlformats.org/presentationml/2006/main">
+  <p:cSld>
+    <p:spTree>
+      <p:nvGrpSpPr>
+        <p:cNvPr id="1" name=""/>
+        <p:cNvGrpSpPr/>
+        <p:nvPr/>
+      </p:nvGrpSpPr>
+      <p:grpSpPr>
+        <a:xfrm>
+          <a:off x="0" y="0"/>
+          <a:ext cx="0" cy="0"/>
+          <a:chOff x="0" y="0"/>
+          <a:chExt cx="0" cy="0"/>
+        </a:xfrm>
+      </p:grpSpPr>
+      <p:sp>
+        <p:nvSpPr>
+          <p:cNvPr id="2" name="Title 1"/>
+          <p:cNvSpPr>
+            <a:spLocks noGrp="1"/>
+          </p:cNvSpPr>
+          <p:nvPr>
+            <p:ph type="title"/>
+          </p:nvPr>
+        </p:nvSpPr>
+        <p:spPr/>
+        <p:txBody>
+          <a:bodyPr/>
+          <a:lstStyle/>
+          <a:p>
+            <a:r>
+              <a:rPr lang="en-GB" dirty="0" smtClean="0"/>
+              <a:t>Proposed plan of action</a:t>
+            </a:r>
+            <a:endParaRPr lang="en-GB" dirty="0"/>
+          </a:p>
+        </p:txBody>
+      </p:sp>
+      <p:sp>
+        <p:nvSpPr>
+          <p:cNvPr id="3" name="Content Placeholder 2"/>
+          <p:cNvSpPr>
+            <a:spLocks noGrp="1"/>
+          </p:cNvSpPr>
+          <p:nvPr>
+            <p:ph idx="1"/>
+          </p:nvPr>
+        </p:nvSpPr>
+        <p:spPr/>
+        <p:txBody>
+          <a:bodyPr>
+            <a:normAutofit lnSpcReduction="10000"/>
+          </a:bodyPr>
+          <a:lstStyle/>
+          <a:p>
+            <a:r>
+              <a:rPr lang="en-GB" dirty="0" smtClean="0"/>
+              <a:t>I (Andy) have started work on splitting the spec doc into Core Metadata and proteomics/metabolomics specific</a:t>
+            </a:r>
+          </a:p>
+          <a:p>
+            <a:r>
+              <a:rPr lang="en-GB" dirty="0" smtClean="0"/>
+              <a:t>Propose to branch fully the mzTab 1.1-M document removing all references to proteomics part</a:t>
+            </a:r>
+          </a:p>
+          <a:p>
+            <a:r>
+              <a:rPr lang="en-GB" dirty="0" smtClean="0"/>
+              <a:t>While doing this re-design, we fully split into core with metabolomics extension parts</a:t>
+            </a:r>
+          </a:p>
+          <a:p>
+            <a:r>
+              <a:rPr lang="en-GB" dirty="0" smtClean="0"/>
+              <a:t>We can then proceed working only on this document</a:t>
+            </a:r>
+          </a:p>
+          <a:p>
+            <a:r>
+              <a:rPr lang="en-GB" dirty="0" smtClean="0"/>
+              <a:t>For proteomics, we can separate out the development of mzTab 1.1-P when the time is right and we have sufficient people to get </a:t>
+            </a:r>
+            <a:r>
+              <a:rPr lang="en-GB" smtClean="0"/>
+              <a:t>this completed</a:t>
+            </a:r>
+          </a:p>
+          <a:p>
+            <a:pPr marL="0" indent="0">
+              <a:buNone/>
+            </a:pPr>
+            <a:endParaRPr lang="en-GB" dirty="0"/>
+          </a:p>
+        </p:txBody>
+      </p:sp>
+    </p:spTree>
+    <p:extLst>
+      <p:ext uri="{BB962C8B-B14F-4D97-AF65-F5344CB8AC3E}">
+        <p14:creationId xmlns:p14="http://schemas.microsoft.com/office/powerpoint/2010/main" val="1362080285"/>
+      </p:ext>
+    </p:extLst>
+  </p:cSld>
+  <p:clrMapOvr>
+    <a:masterClrMapping/>
+  </p:clrMapOvr>
+</p:sld>
+</file>
+
 <file path=ppt/slides/slide2.xml><?xml version="1.0" encoding="utf-8"?>
 <p:sld xmlns:a="http://schemas.openxmlformats.org/drawingml/2006/main" xmlns:r="http://schemas.openxmlformats.org/officeDocument/2006/relationships" xmlns:p="http://schemas.openxmlformats.org/presentationml/2006/main">
   <p:cSld>
@@ -6479,11 +6591,7 @@
           <a:p>
             <a:r>
               <a:rPr lang="en-GB" sz="1200" dirty="0" smtClean="0"/>
-              <a:t>In case of ID only files, abundance columns are nulled; force exporters to add layer aggregating PSMs into peptides (e.g. mzIdentML already has a peptide section anyway, so this is really the same work</a:t>
-            </a:r>
-            <a:r>
-              <a:rPr lang="en-GB" sz="1200" dirty="0" smtClean="0"/>
-              <a:t>). </a:t>
+              <a:t>In case of ID only files, abundance columns are nulled; force exporters to add layer aggregating PSMs into peptides (e.g. mzIdentML already has a peptide section anyway, so this is really the same work). </a:t>
             </a:r>
             <a:endParaRPr lang="en-GB" sz="1200" dirty="0"/>
           </a:p>
@@ -6533,11 +6641,7 @@
             </a:r>
             <a:r>
               <a:rPr lang="en-GB" sz="1200" b="1" dirty="0" smtClean="0"/>
-              <a:t>” (MORE DISCUSSION </a:t>
-            </a:r>
-            <a:r>
-              <a:rPr lang="en-GB" sz="1200" b="1" dirty="0" smtClean="0"/>
-              <a:t>NEEDED*)</a:t>
+              <a:t>” (MORE DISCUSSION NEEDED*)</a:t>
             </a:r>
             <a:endParaRPr lang="en-GB" sz="1200" b="1" dirty="0"/>
           </a:p>

</xml_diff>